<commit_message>
Add session storage and cookie support
Introduce session storage and cookie management to the Blazor app:
- Add `Blazored.SessionStorage` package to `BlazorForelApp.csproj`.
- Update `Storage.razor` to demonstrate local storage, session storage, and cookies with new UI elements.
- Modify `Program.cs` to register `Blazored.SessionStorage` and `CookieService`.
- Implement JavaScript functions in `index.html` for cookie handling.
- Create `CookieService.cs` for cookie operations, including complex object handling.
- Expand `Storage.razor` with methods for session storage and cookies.
- Add new classes for complex objects like `ProductData`.
</commit_message>
<xml_diff>
--- a/slides/blazor_giorno_3.pptx
+++ b/slides/blazor_giorno_3.pptx
@@ -5,10 +5,10 @@
     <p:sldMasterId id="2147483672" r:id="rId1"/>
   </p:sldMasterIdLst>
   <p:notesMasterIdLst>
-    <p:notesMasterId r:id="rId9"/>
+    <p:notesMasterId r:id="rId10"/>
   </p:notesMasterIdLst>
   <p:handoutMasterIdLst>
-    <p:handoutMasterId r:id="rId10"/>
+    <p:handoutMasterId r:id="rId11"/>
   </p:handoutMasterIdLst>
   <p:sldIdLst>
     <p:sldId id="256" r:id="rId2"/>
@@ -17,7 +17,8 @@
     <p:sldId id="264" r:id="rId5"/>
     <p:sldId id="265" r:id="rId6"/>
     <p:sldId id="267" r:id="rId7"/>
-    <p:sldId id="268" r:id="rId8"/>
+    <p:sldId id="269" r:id="rId8"/>
+    <p:sldId id="268" r:id="rId9"/>
   </p:sldIdLst>
   <p:sldSz cx="12192000" cy="6858000"/>
   <p:notesSz cx="6858000" cy="9144000"/>
@@ -223,7 +224,7 @@
             <a:pPr rtl="0"/>
             <a:fld id="{C0FA3576-2E34-44A5-91FF-3C53AC3DA648}" type="datetime1">
               <a:rPr lang="it-IT" smtClean="0"/>
-              <a:t>10/10/2025</a:t>
+              <a:t>11/10/2025</a:t>
             </a:fld>
             <a:endParaRPr lang="it-IT"/>
           </a:p>
@@ -405,7 +406,7 @@
             <a:fld id="{F8F21FEC-DF32-4E90-A279-29D5C0BB0773}" type="datetime1">
               <a:rPr lang="it-IT" smtClean="0"/>
               <a:pPr/>
-              <a:t>10/10/2025</a:t>
+              <a:t>11/10/2025</a:t>
             </a:fld>
             <a:endParaRPr lang="it-IT" dirty="0"/>
           </a:p>
@@ -836,7 +837,7 @@
             <a:pPr rtl="0"/>
             <a:fld id="{C6B3AB32-59DF-41F1-9618-EDFBF5049629}" type="slidenum">
               <a:rPr lang="it-IT" noProof="0" smtClean="0"/>
-              <a:t>7</a:t>
+              <a:t>8</a:t>
             </a:fld>
             <a:endParaRPr lang="it-IT" noProof="0"/>
           </a:p>
@@ -1108,7 +1109,7 @@
             <a:pPr rtl="0"/>
             <a:fld id="{87A23933-3F77-4C59-A775-45E2435C8368}" type="datetime1">
               <a:rPr lang="it-IT" noProof="0" smtClean="0"/>
-              <a:t>10/10/2025</a:t>
+              <a:t>11/10/2025</a:t>
             </a:fld>
             <a:endParaRPr lang="it-IT" noProof="0"/>
           </a:p>
@@ -1373,7 +1374,7 @@
             <a:pPr rtl="0"/>
             <a:fld id="{4B4ECE9F-4108-4829-8F23-DFA9C926965D}" type="datetime1">
               <a:rPr lang="it-IT" noProof="0" smtClean="0"/>
-              <a:t>10/10/2025</a:t>
+              <a:t>11/10/2025</a:t>
             </a:fld>
             <a:endParaRPr lang="it-IT" noProof="0"/>
           </a:p>
@@ -1611,7 +1612,7 @@
             <a:pPr rtl="0"/>
             <a:fld id="{2AB59B6B-A2EF-4B30-AEF7-A3091D0F5449}" type="datetime1">
               <a:rPr lang="it-IT" noProof="0" smtClean="0"/>
-              <a:t>10/10/2025</a:t>
+              <a:t>11/10/2025</a:t>
             </a:fld>
             <a:endParaRPr lang="it-IT" noProof="0" dirty="0"/>
           </a:p>
@@ -1861,7 +1862,7 @@
             <a:pPr rtl="0"/>
             <a:fld id="{7F3FB14C-AC96-42E5-BE0B-73EFAA1A7EA7}" type="datetime1">
               <a:rPr lang="it-IT" noProof="0" smtClean="0"/>
-              <a:t>10/10/2025</a:t>
+              <a:t>11/10/2025</a:t>
             </a:fld>
             <a:endParaRPr lang="it-IT" noProof="0"/>
           </a:p>
@@ -2172,7 +2173,7 @@
             <a:pPr rtl="0"/>
             <a:fld id="{76327E91-20FF-43F1-A337-75953C73E7D7}" type="datetime1">
               <a:rPr lang="it-IT" noProof="0" smtClean="0"/>
-              <a:t>10/10/2025</a:t>
+              <a:t>11/10/2025</a:t>
             </a:fld>
             <a:endParaRPr lang="it-IT" noProof="0"/>
           </a:p>
@@ -2483,7 +2484,7 @@
             <a:pPr rtl="0"/>
             <a:fld id="{9EDCB701-B7F2-4988-9CFB-241C1D412354}" type="datetime1">
               <a:rPr lang="it-IT" noProof="0" smtClean="0"/>
-              <a:t>10/10/2025</a:t>
+              <a:t>11/10/2025</a:t>
             </a:fld>
             <a:endParaRPr lang="it-IT" noProof="0"/>
           </a:p>
@@ -2907,7 +2908,7 @@
             <a:pPr rtl="0"/>
             <a:fld id="{4B9B0459-76CC-4B94-A6C6-908B17D42BC8}" type="datetime1">
               <a:rPr lang="it-IT" noProof="0" smtClean="0"/>
-              <a:t>10/10/2025</a:t>
+              <a:t>11/10/2025</a:t>
             </a:fld>
             <a:endParaRPr lang="it-IT" noProof="0"/>
           </a:p>
@@ -3006,7 +3007,7 @@
             <a:pPr rtl="0"/>
             <a:fld id="{62D572E4-8572-44CF-B6FA-B15ECB2B0691}" type="datetime1">
               <a:rPr lang="it-IT" noProof="0" smtClean="0"/>
-              <a:t>10/10/2025</a:t>
+              <a:t>11/10/2025</a:t>
             </a:fld>
             <a:endParaRPr lang="it-IT" noProof="0"/>
           </a:p>
@@ -3172,7 +3173,7 @@
             <a:pPr rtl="0"/>
             <a:fld id="{5F266B29-8DDF-40ED-AC5D-ED73AC5A6521}" type="datetime1">
               <a:rPr lang="it-IT" noProof="0" smtClean="0"/>
-              <a:t>10/10/2025</a:t>
+              <a:t>11/10/2025</a:t>
             </a:fld>
             <a:endParaRPr lang="it-IT" noProof="0"/>
           </a:p>
@@ -3553,7 +3554,7 @@
             <a:pPr rtl="0"/>
             <a:fld id="{4CFC7787-2DFD-4221-B49C-354C37128239}" type="datetime1">
               <a:rPr lang="it-IT" noProof="0" smtClean="0"/>
-              <a:t>10/10/2025</a:t>
+              <a:t>11/10/2025</a:t>
             </a:fld>
             <a:endParaRPr lang="it-IT" noProof="0"/>
           </a:p>
@@ -3846,7 +3847,7 @@
             <a:pPr rtl="0"/>
             <a:fld id="{D3F07A8F-C5D3-4128-B052-E864993A59CE}" type="datetime1">
               <a:rPr lang="it-IT" noProof="0" smtClean="0"/>
-              <a:t>10/10/2025</a:t>
+              <a:t>11/10/2025</a:t>
             </a:fld>
             <a:endParaRPr lang="it-IT" noProof="0"/>
           </a:p>
@@ -4060,7 +4061,7 @@
             <a:pPr rtl="0"/>
             <a:fld id="{A36BACEF-F5E2-445B-BCCF-A68C06C41D7B}" type="datetime1">
               <a:rPr lang="it-IT" noProof="0" smtClean="0"/>
-              <a:t>10/10/2025</a:t>
+              <a:t>11/10/2025</a:t>
             </a:fld>
             <a:endParaRPr lang="it-IT" noProof="0" dirty="0"/>
           </a:p>
@@ -5409,19 +5410,11 @@
             </a:r>
             <a:r>
               <a:rPr lang="it-IT" dirty="0" err="1"/>
-              <a:t>sessionStorage</a:t>
+              <a:t>localStorage</a:t>
             </a:r>
             <a:r>
               <a:rPr lang="it-IT" dirty="0"/>
-              <a:t>/</a:t>
-            </a:r>
-            <a:r>
-              <a:rPr lang="it-IT" dirty="0" err="1"/>
-              <a:t>localStorage</a:t>
-            </a:r>
-            <a:r>
-              <a:rPr lang="it-IT" dirty="0"/>
-              <a:t>)</a:t>
+              <a:t>/cookies)</a:t>
             </a:r>
           </a:p>
           <a:p>
@@ -5706,7 +5699,7 @@
           <a:p>
             <a:r>
               <a:rPr lang="en-US" b="1" dirty="0"/>
-              <a:t>Storage</a:t>
+              <a:t>Storage / cookie</a:t>
             </a:r>
             <a:endParaRPr lang="it-IT" dirty="0"/>
           </a:p>
@@ -5728,67 +5721,74 @@
             <p:ph sz="half" idx="1"/>
           </p:nvPr>
         </p:nvSpPr>
-        <p:spPr/>
+        <p:spPr>
+          <a:xfrm>
+            <a:off x="581192" y="2228003"/>
+            <a:ext cx="11138483" cy="3633047"/>
+          </a:xfrm>
+        </p:spPr>
         <p:txBody>
           <a:bodyPr>
-            <a:normAutofit/>
+            <a:normAutofit lnSpcReduction="10000"/>
           </a:bodyPr>
           <a:lstStyle/>
           <a:p>
             <a:r>
               <a:rPr lang="it-IT" dirty="0" err="1"/>
+              <a:t>LocalStorage</a:t>
+            </a:r>
+            <a:endParaRPr lang="it-IT" dirty="0"/>
+          </a:p>
+          <a:p>
+            <a:pPr lvl="1"/>
+            <a:r>
+              <a:rPr lang="it-IT" dirty="0"/>
+              <a:t>è progettato per archiviare dati sul lato client che persistono anche dopo la chiusura del browser (10 MB per dominio)</a:t>
+            </a:r>
+          </a:p>
+          <a:p>
+            <a:r>
+              <a:rPr lang="it-IT" dirty="0" err="1"/>
               <a:t>SessionStorage</a:t>
             </a:r>
             <a:endParaRPr lang="it-IT" dirty="0"/>
           </a:p>
           <a:p>
-            <a:r>
-              <a:rPr lang="it-IT" dirty="0" err="1"/>
-              <a:t>ProtectedSessionStore</a:t>
-            </a:r>
+            <a:pPr lvl="1"/>
+            <a:r>
+              <a:rPr lang="it-IT" dirty="0"/>
+              <a:t>memorizza anche i dati sul lato client, ma è limitato alla durata della sessione della pagina. Ciò significa che i dati vengono cancellati quando l’utente chiude la scheda o la finestra del browser(5 MB)</a:t>
+            </a:r>
+          </a:p>
+          <a:p>
+            <a:r>
+              <a:rPr lang="it-IT" dirty="0"/>
+              <a:t>Cookie</a:t>
+            </a:r>
+          </a:p>
+          <a:p>
+            <a:pPr lvl="1"/>
+            <a:r>
+              <a:rPr lang="it-IT" dirty="0"/>
+              <a:t>i cookie vengono utilizzati per memorizzare piccoli pezzi di dati che devono persistere tra le sessioni e possono essere inviati con richieste HTTP al server. Sono spesso utilizzati per tracciare le sessioni utente, memorizzare token di autenticazione e ricordare le impostazioni utente.</a:t>
+            </a:r>
+          </a:p>
+          <a:p>
+            <a:pPr lvl="2"/>
+            <a:r>
+              <a:rPr lang="it-IT" dirty="0"/>
+              <a:t>limite di 4 KB per cookie</a:t>
+            </a:r>
+          </a:p>
+          <a:p>
+            <a:pPr lvl="2"/>
+            <a:r>
+              <a:rPr lang="it-IT" dirty="0"/>
+              <a:t>tempo di scadenza configurabile</a:t>
+            </a:r>
+          </a:p>
+          <a:p>
             <a:endParaRPr lang="it-IT" dirty="0"/>
-          </a:p>
-          <a:p>
-            <a:r>
-              <a:rPr lang="it-IT" dirty="0" err="1"/>
-              <a:t>LocalStorage</a:t>
-            </a:r>
-            <a:endParaRPr lang="it-IT" dirty="0"/>
-          </a:p>
-          <a:p>
-            <a:r>
-              <a:rPr lang="it-IT" dirty="0" err="1"/>
-              <a:t>ProtectedLocalStore</a:t>
-            </a:r>
-            <a:endParaRPr lang="it-IT" dirty="0"/>
-          </a:p>
-          <a:p>
-            <a:endParaRPr lang="it-IT" dirty="0"/>
-          </a:p>
-        </p:txBody>
-      </p:sp>
-      <p:sp>
-        <p:nvSpPr>
-          <p:cNvPr id="4" name="Segnaposto contenuto 3">
-            <a:extLst>
-              <a:ext uri="{FF2B5EF4-FFF2-40B4-BE49-F238E27FC236}">
-                <a16:creationId xmlns:a16="http://schemas.microsoft.com/office/drawing/2014/main" id="{D812ECBB-91E8-7501-0C2C-CAE0FF82C15C}"/>
-              </a:ext>
-            </a:extLst>
-          </p:cNvPr>
-          <p:cNvSpPr>
-            <a:spLocks noGrp="1"/>
-          </p:cNvSpPr>
-          <p:nvPr>
-            <p:ph sz="half" idx="2"/>
-          </p:nvPr>
-        </p:nvSpPr>
-        <p:spPr/>
-        <p:txBody>
-          <a:bodyPr/>
-          <a:lstStyle/>
-          <a:p>
-            <a:endParaRPr lang="it-IT"/>
           </a:p>
         </p:txBody>
       </p:sp>
@@ -5806,6 +5806,141 @@
 </file>
 
 <file path=ppt/slides/slide7.xml><?xml version="1.0" encoding="utf-8"?>
+<p:sld xmlns:a="http://schemas.openxmlformats.org/drawingml/2006/main" xmlns:r="http://schemas.openxmlformats.org/officeDocument/2006/relationships" xmlns:p="http://schemas.openxmlformats.org/presentationml/2006/main">
+  <p:cSld>
+    <p:spTree>
+      <p:nvGrpSpPr>
+        <p:cNvPr id="1" name="">
+          <a:extLst>
+            <a:ext uri="{FF2B5EF4-FFF2-40B4-BE49-F238E27FC236}">
+              <a16:creationId xmlns:a16="http://schemas.microsoft.com/office/drawing/2014/main" id="{EE072EBC-F697-6D81-853B-F3C907CC4D29}"/>
+            </a:ext>
+          </a:extLst>
+        </p:cNvPr>
+        <p:cNvGrpSpPr/>
+        <p:nvPr/>
+      </p:nvGrpSpPr>
+      <p:grpSpPr>
+        <a:xfrm>
+          <a:off x="0" y="0"/>
+          <a:ext cx="0" cy="0"/>
+          <a:chOff x="0" y="0"/>
+          <a:chExt cx="0" cy="0"/>
+        </a:xfrm>
+      </p:grpSpPr>
+      <p:sp>
+        <p:nvSpPr>
+          <p:cNvPr id="2" name="Titolo 1">
+            <a:extLst>
+              <a:ext uri="{FF2B5EF4-FFF2-40B4-BE49-F238E27FC236}">
+                <a16:creationId xmlns:a16="http://schemas.microsoft.com/office/drawing/2014/main" id="{72688DBA-1B58-4E0D-75D4-61AEFE27AEDB}"/>
+              </a:ext>
+            </a:extLst>
+          </p:cNvPr>
+          <p:cNvSpPr>
+            <a:spLocks noGrp="1"/>
+          </p:cNvSpPr>
+          <p:nvPr>
+            <p:ph type="title"/>
+          </p:nvPr>
+        </p:nvSpPr>
+        <p:spPr/>
+        <p:txBody>
+          <a:bodyPr/>
+          <a:lstStyle/>
+          <a:p>
+            <a:r>
+              <a:rPr lang="en-US" b="1" dirty="0"/>
+              <a:t>Storage / cookie</a:t>
+            </a:r>
+            <a:endParaRPr lang="it-IT" dirty="0"/>
+          </a:p>
+        </p:txBody>
+      </p:sp>
+      <p:sp>
+        <p:nvSpPr>
+          <p:cNvPr id="5" name="Segnaposto contenuto 4">
+            <a:extLst>
+              <a:ext uri="{FF2B5EF4-FFF2-40B4-BE49-F238E27FC236}">
+                <a16:creationId xmlns:a16="http://schemas.microsoft.com/office/drawing/2014/main" id="{C0764515-E783-706D-60DB-433F140426D7}"/>
+              </a:ext>
+            </a:extLst>
+          </p:cNvPr>
+          <p:cNvSpPr>
+            <a:spLocks noGrp="1"/>
+          </p:cNvSpPr>
+          <p:nvPr>
+            <p:ph sz="half" idx="1"/>
+          </p:nvPr>
+        </p:nvSpPr>
+        <p:spPr>
+          <a:xfrm>
+            <a:off x="581192" y="2228003"/>
+            <a:ext cx="11138483" cy="3633047"/>
+          </a:xfrm>
+        </p:spPr>
+        <p:txBody>
+          <a:bodyPr>
+            <a:normAutofit/>
+          </a:bodyPr>
+          <a:lstStyle/>
+          <a:p>
+            <a:r>
+              <a:rPr lang="it-IT" dirty="0" err="1"/>
+              <a:t>LocalStorage</a:t>
+            </a:r>
+            <a:endParaRPr lang="it-IT" dirty="0"/>
+          </a:p>
+          <a:p>
+            <a:pPr lvl="1"/>
+            <a:r>
+              <a:rPr lang="it-IT" dirty="0"/>
+              <a:t>da utilizzare quando è necessario archiviare grandi quantità di dati che devono persistere su più sessioni e non sono sensibili (ad esempio, preferenze utente, stato dell’applicazione non sensibile)</a:t>
+            </a:r>
+          </a:p>
+          <a:p>
+            <a:r>
+              <a:rPr lang="it-IT" dirty="0" err="1"/>
+              <a:t>SessionStorage</a:t>
+            </a:r>
+            <a:endParaRPr lang="it-IT" dirty="0"/>
+          </a:p>
+          <a:p>
+            <a:pPr lvl="1"/>
+            <a:r>
+              <a:rPr lang="it-IT" dirty="0"/>
+              <a:t>ideale per dati temporanei che devono persistere solo per la durata della sessione dell’utente (ad esempio, dati di moduli di una singola sessione, stato temporaneo).</a:t>
+            </a:r>
+          </a:p>
+          <a:p>
+            <a:r>
+              <a:rPr lang="it-IT" dirty="0"/>
+              <a:t>Cookie</a:t>
+            </a:r>
+          </a:p>
+          <a:p>
+            <a:pPr lvl="1"/>
+            <a:r>
+              <a:rPr lang="it-IT" dirty="0"/>
+              <a:t>ideali per archiviare piccole porzioni di dati che devono essere inviate al server tramite richieste HTTP o che necessitano di una scadenza specifica (ad esempio, token di autenticazione, preferenze utente che devono interagire con il server)</a:t>
+            </a:r>
+          </a:p>
+        </p:txBody>
+      </p:sp>
+    </p:spTree>
+    <p:extLst>
+      <p:ext uri="{BB962C8B-B14F-4D97-AF65-F5344CB8AC3E}">
+        <p14:creationId xmlns:p14="http://schemas.microsoft.com/office/powerpoint/2010/main" val="1813958565"/>
+      </p:ext>
+    </p:extLst>
+  </p:cSld>
+  <p:clrMapOvr>
+    <a:masterClrMapping/>
+  </p:clrMapOvr>
+</p:sld>
+</file>
+
+<file path=ppt/slides/slide8.xml><?xml version="1.0" encoding="utf-8"?>
 <p:sld xmlns:a="http://schemas.openxmlformats.org/drawingml/2006/main" xmlns:r="http://schemas.openxmlformats.org/officeDocument/2006/relationships" xmlns:p="http://schemas.openxmlformats.org/presentationml/2006/main">
   <p:cSld>
     <p:spTree>

</xml_diff>

<commit_message>
Add @@bind Demo with new Blazor component and styles
- Added a new navigation link in NavMenu.razor for the "@@bind Demo" page.
- Made a minor formatting fix in HtmlCssDemo.razor.
- Introduced BIND_FORMATTING_DEMO_README.md with detailed instructions and explanations for the new demo, written in Italian.
- Created BindFormattingDemo.razor to demonstrate `@bind` with formatting and conversion, including various binding techniques and controls.
- Added bind-formatting-demo.css to style the demo page, enhancing its visual presentation and user experience.
</commit_message>
<xml_diff>
--- a/slides/blazor_giorno_3.pptx
+++ b/slides/blazor_giorno_3.pptx
@@ -224,7 +224,7 @@
             <a:pPr rtl="0"/>
             <a:fld id="{C0FA3576-2E34-44A5-91FF-3C53AC3DA648}" type="datetime1">
               <a:rPr lang="it-IT" smtClean="0"/>
-              <a:t>11/10/2025</a:t>
+              <a:t>18/10/2025</a:t>
             </a:fld>
             <a:endParaRPr lang="it-IT"/>
           </a:p>
@@ -406,7 +406,7 @@
             <a:fld id="{F8F21FEC-DF32-4E90-A279-29D5C0BB0773}" type="datetime1">
               <a:rPr lang="it-IT" smtClean="0"/>
               <a:pPr/>
-              <a:t>11/10/2025</a:t>
+              <a:t>18/10/2025</a:t>
             </a:fld>
             <a:endParaRPr lang="it-IT" dirty="0"/>
           </a:p>
@@ -1109,7 +1109,7 @@
             <a:pPr rtl="0"/>
             <a:fld id="{87A23933-3F77-4C59-A775-45E2435C8368}" type="datetime1">
               <a:rPr lang="it-IT" noProof="0" smtClean="0"/>
-              <a:t>11/10/2025</a:t>
+              <a:t>18/10/2025</a:t>
             </a:fld>
             <a:endParaRPr lang="it-IT" noProof="0"/>
           </a:p>
@@ -1374,7 +1374,7 @@
             <a:pPr rtl="0"/>
             <a:fld id="{4B4ECE9F-4108-4829-8F23-DFA9C926965D}" type="datetime1">
               <a:rPr lang="it-IT" noProof="0" smtClean="0"/>
-              <a:t>11/10/2025</a:t>
+              <a:t>18/10/2025</a:t>
             </a:fld>
             <a:endParaRPr lang="it-IT" noProof="0"/>
           </a:p>
@@ -1612,7 +1612,7 @@
             <a:pPr rtl="0"/>
             <a:fld id="{2AB59B6B-A2EF-4B30-AEF7-A3091D0F5449}" type="datetime1">
               <a:rPr lang="it-IT" noProof="0" smtClean="0"/>
-              <a:t>11/10/2025</a:t>
+              <a:t>18/10/2025</a:t>
             </a:fld>
             <a:endParaRPr lang="it-IT" noProof="0" dirty="0"/>
           </a:p>
@@ -1862,7 +1862,7 @@
             <a:pPr rtl="0"/>
             <a:fld id="{7F3FB14C-AC96-42E5-BE0B-73EFAA1A7EA7}" type="datetime1">
               <a:rPr lang="it-IT" noProof="0" smtClean="0"/>
-              <a:t>11/10/2025</a:t>
+              <a:t>18/10/2025</a:t>
             </a:fld>
             <a:endParaRPr lang="it-IT" noProof="0"/>
           </a:p>
@@ -2173,7 +2173,7 @@
             <a:pPr rtl="0"/>
             <a:fld id="{76327E91-20FF-43F1-A337-75953C73E7D7}" type="datetime1">
               <a:rPr lang="it-IT" noProof="0" smtClean="0"/>
-              <a:t>11/10/2025</a:t>
+              <a:t>18/10/2025</a:t>
             </a:fld>
             <a:endParaRPr lang="it-IT" noProof="0"/>
           </a:p>
@@ -2484,7 +2484,7 @@
             <a:pPr rtl="0"/>
             <a:fld id="{9EDCB701-B7F2-4988-9CFB-241C1D412354}" type="datetime1">
               <a:rPr lang="it-IT" noProof="0" smtClean="0"/>
-              <a:t>11/10/2025</a:t>
+              <a:t>18/10/2025</a:t>
             </a:fld>
             <a:endParaRPr lang="it-IT" noProof="0"/>
           </a:p>
@@ -2908,7 +2908,7 @@
             <a:pPr rtl="0"/>
             <a:fld id="{4B9B0459-76CC-4B94-A6C6-908B17D42BC8}" type="datetime1">
               <a:rPr lang="it-IT" noProof="0" smtClean="0"/>
-              <a:t>11/10/2025</a:t>
+              <a:t>18/10/2025</a:t>
             </a:fld>
             <a:endParaRPr lang="it-IT" noProof="0"/>
           </a:p>
@@ -3007,7 +3007,7 @@
             <a:pPr rtl="0"/>
             <a:fld id="{62D572E4-8572-44CF-B6FA-B15ECB2B0691}" type="datetime1">
               <a:rPr lang="it-IT" noProof="0" smtClean="0"/>
-              <a:t>11/10/2025</a:t>
+              <a:t>18/10/2025</a:t>
             </a:fld>
             <a:endParaRPr lang="it-IT" noProof="0"/>
           </a:p>
@@ -3173,7 +3173,7 @@
             <a:pPr rtl="0"/>
             <a:fld id="{5F266B29-8DDF-40ED-AC5D-ED73AC5A6521}" type="datetime1">
               <a:rPr lang="it-IT" noProof="0" smtClean="0"/>
-              <a:t>11/10/2025</a:t>
+              <a:t>18/10/2025</a:t>
             </a:fld>
             <a:endParaRPr lang="it-IT" noProof="0"/>
           </a:p>
@@ -3554,7 +3554,7 @@
             <a:pPr rtl="0"/>
             <a:fld id="{4CFC7787-2DFD-4221-B49C-354C37128239}" type="datetime1">
               <a:rPr lang="it-IT" noProof="0" smtClean="0"/>
-              <a:t>11/10/2025</a:t>
+              <a:t>18/10/2025</a:t>
             </a:fld>
             <a:endParaRPr lang="it-IT" noProof="0"/>
           </a:p>
@@ -3847,7 +3847,7 @@
             <a:pPr rtl="0"/>
             <a:fld id="{D3F07A8F-C5D3-4128-B052-E864993A59CE}" type="datetime1">
               <a:rPr lang="it-IT" noProof="0" smtClean="0"/>
-              <a:t>11/10/2025</a:t>
+              <a:t>18/10/2025</a:t>
             </a:fld>
             <a:endParaRPr lang="it-IT" noProof="0"/>
           </a:p>
@@ -4061,7 +4061,7 @@
             <a:pPr rtl="0"/>
             <a:fld id="{A36BACEF-F5E2-445B-BCCF-A68C06C41D7B}" type="datetime1">
               <a:rPr lang="it-IT" noProof="0" smtClean="0"/>
-              <a:t>11/10/2025</a:t>
+              <a:t>18/10/2025</a:t>
             </a:fld>
             <a:endParaRPr lang="it-IT" noProof="0" dirty="0"/>
           </a:p>
@@ -5543,6 +5543,31 @@
           <a:p>
             <a:r>
               <a:rPr lang="it-IT" dirty="0"/>
+              <a:t>@bind con formattazione e conversione</a:t>
+            </a:r>
+          </a:p>
+          <a:p>
+            <a:r>
+              <a:rPr lang="it-IT" dirty="0"/>
+              <a:t>Validazione dei form con </a:t>
+            </a:r>
+            <a:r>
+              <a:rPr lang="it-IT" dirty="0" err="1"/>
+              <a:t>EditForm</a:t>
+            </a:r>
+            <a:r>
+              <a:rPr lang="it-IT" dirty="0"/>
+              <a:t> e </a:t>
+            </a:r>
+            <a:r>
+              <a:rPr lang="it-IT" dirty="0" err="1"/>
+              <a:t>DataAnnotations</a:t>
+            </a:r>
+            <a:endParaRPr lang="it-IT" dirty="0"/>
+          </a:p>
+          <a:p>
+            <a:r>
+              <a:rPr lang="it-IT" dirty="0"/>
               <a:t>Esercizi pratici</a:t>
             </a:r>
           </a:p>
@@ -5632,6 +5657,48 @@
         <p:txBody>
           <a:bodyPr/>
           <a:lstStyle/>
+          <a:p>
+            <a:r>
+              <a:rPr lang="it-IT" dirty="0"/>
+              <a:t>Protezione delle </a:t>
+            </a:r>
+            <a:r>
+              <a:rPr lang="it-IT" dirty="0" err="1"/>
+              <a:t>route</a:t>
+            </a:r>
+            <a:r>
+              <a:rPr lang="it-IT" dirty="0"/>
+              <a:t> e dei componenti con </a:t>
+            </a:r>
+            <a:r>
+              <a:rPr lang="it-IT" dirty="0" err="1"/>
+              <a:t>authorizeView</a:t>
+            </a:r>
+            <a:r>
+              <a:rPr lang="it-IT" dirty="0"/>
+              <a:t> e </a:t>
+            </a:r>
+            <a:r>
+              <a:rPr lang="it-IT" dirty="0" err="1"/>
+              <a:t>authorize</a:t>
+            </a:r>
+            <a:endParaRPr lang="it-IT" dirty="0"/>
+          </a:p>
+          <a:p>
+            <a:r>
+              <a:rPr lang="it-IT" dirty="0" err="1"/>
+              <a:t>Appsettings</a:t>
+            </a:r>
+            <a:r>
+              <a:rPr lang="it-IT" dirty="0"/>
+              <a:t> and </a:t>
+            </a:r>
+            <a:r>
+              <a:rPr lang="it-IT" dirty="0" err="1"/>
+              <a:t>IConfiguration</a:t>
+            </a:r>
+            <a:endParaRPr lang="it-IT" dirty="0"/>
+          </a:p>
           <a:p>
             <a:r>
               <a:rPr lang="it-IT" dirty="0"/>

</xml_diff>

<commit_message>
Enhance Blazor components and routing
Updated `Counter.razor` to improve input handling by adding a `type` attribute and specifying `@bind:event="oninput"`. Enhanced `DemoPageWithParam.razor` with additional route templates and introduced a new nullable string parameter `Id2`. Added `System.ComponentModel.DataAnnotations` to `FormValidationDemo.razor` for form validation. Modified `blazor_giorno_3.pptx` binary file.
</commit_message>
<xml_diff>
--- a/slides/blazor_giorno_3.pptx
+++ b/slides/blazor_giorno_3.pptx
@@ -224,7 +224,7 @@
             <a:pPr rtl="0"/>
             <a:fld id="{C0FA3576-2E34-44A5-91FF-3C53AC3DA648}" type="datetime1">
               <a:rPr lang="it-IT" smtClean="0"/>
-              <a:t>18/10/2025</a:t>
+              <a:t>20/10/2025</a:t>
             </a:fld>
             <a:endParaRPr lang="it-IT"/>
           </a:p>
@@ -406,7 +406,7 @@
             <a:fld id="{F8F21FEC-DF32-4E90-A279-29D5C0BB0773}" type="datetime1">
               <a:rPr lang="it-IT" smtClean="0"/>
               <a:pPr/>
-              <a:t>18/10/2025</a:t>
+              <a:t>20/10/2025</a:t>
             </a:fld>
             <a:endParaRPr lang="it-IT" dirty="0"/>
           </a:p>
@@ -1109,7 +1109,7 @@
             <a:pPr rtl="0"/>
             <a:fld id="{87A23933-3F77-4C59-A775-45E2435C8368}" type="datetime1">
               <a:rPr lang="it-IT" noProof="0" smtClean="0"/>
-              <a:t>18/10/2025</a:t>
+              <a:t>20/10/2025</a:t>
             </a:fld>
             <a:endParaRPr lang="it-IT" noProof="0"/>
           </a:p>
@@ -1374,7 +1374,7 @@
             <a:pPr rtl="0"/>
             <a:fld id="{4B4ECE9F-4108-4829-8F23-DFA9C926965D}" type="datetime1">
               <a:rPr lang="it-IT" noProof="0" smtClean="0"/>
-              <a:t>18/10/2025</a:t>
+              <a:t>20/10/2025</a:t>
             </a:fld>
             <a:endParaRPr lang="it-IT" noProof="0"/>
           </a:p>
@@ -1612,7 +1612,7 @@
             <a:pPr rtl="0"/>
             <a:fld id="{2AB59B6B-A2EF-4B30-AEF7-A3091D0F5449}" type="datetime1">
               <a:rPr lang="it-IT" noProof="0" smtClean="0"/>
-              <a:t>18/10/2025</a:t>
+              <a:t>20/10/2025</a:t>
             </a:fld>
             <a:endParaRPr lang="it-IT" noProof="0" dirty="0"/>
           </a:p>
@@ -1862,7 +1862,7 @@
             <a:pPr rtl="0"/>
             <a:fld id="{7F3FB14C-AC96-42E5-BE0B-73EFAA1A7EA7}" type="datetime1">
               <a:rPr lang="it-IT" noProof="0" smtClean="0"/>
-              <a:t>18/10/2025</a:t>
+              <a:t>20/10/2025</a:t>
             </a:fld>
             <a:endParaRPr lang="it-IT" noProof="0"/>
           </a:p>
@@ -2173,7 +2173,7 @@
             <a:pPr rtl="0"/>
             <a:fld id="{76327E91-20FF-43F1-A337-75953C73E7D7}" type="datetime1">
               <a:rPr lang="it-IT" noProof="0" smtClean="0"/>
-              <a:t>18/10/2025</a:t>
+              <a:t>20/10/2025</a:t>
             </a:fld>
             <a:endParaRPr lang="it-IT" noProof="0"/>
           </a:p>
@@ -2484,7 +2484,7 @@
             <a:pPr rtl="0"/>
             <a:fld id="{9EDCB701-B7F2-4988-9CFB-241C1D412354}" type="datetime1">
               <a:rPr lang="it-IT" noProof="0" smtClean="0"/>
-              <a:t>18/10/2025</a:t>
+              <a:t>20/10/2025</a:t>
             </a:fld>
             <a:endParaRPr lang="it-IT" noProof="0"/>
           </a:p>
@@ -2908,7 +2908,7 @@
             <a:pPr rtl="0"/>
             <a:fld id="{4B9B0459-76CC-4B94-A6C6-908B17D42BC8}" type="datetime1">
               <a:rPr lang="it-IT" noProof="0" smtClean="0"/>
-              <a:t>18/10/2025</a:t>
+              <a:t>20/10/2025</a:t>
             </a:fld>
             <a:endParaRPr lang="it-IT" noProof="0"/>
           </a:p>
@@ -3007,7 +3007,7 @@
             <a:pPr rtl="0"/>
             <a:fld id="{62D572E4-8572-44CF-B6FA-B15ECB2B0691}" type="datetime1">
               <a:rPr lang="it-IT" noProof="0" smtClean="0"/>
-              <a:t>18/10/2025</a:t>
+              <a:t>20/10/2025</a:t>
             </a:fld>
             <a:endParaRPr lang="it-IT" noProof="0"/>
           </a:p>
@@ -3173,7 +3173,7 @@
             <a:pPr rtl="0"/>
             <a:fld id="{5F266B29-8DDF-40ED-AC5D-ED73AC5A6521}" type="datetime1">
               <a:rPr lang="it-IT" noProof="0" smtClean="0"/>
-              <a:t>18/10/2025</a:t>
+              <a:t>20/10/2025</a:t>
             </a:fld>
             <a:endParaRPr lang="it-IT" noProof="0"/>
           </a:p>
@@ -3554,7 +3554,7 @@
             <a:pPr rtl="0"/>
             <a:fld id="{4CFC7787-2DFD-4221-B49C-354C37128239}" type="datetime1">
               <a:rPr lang="it-IT" noProof="0" smtClean="0"/>
-              <a:t>18/10/2025</a:t>
+              <a:t>20/10/2025</a:t>
             </a:fld>
             <a:endParaRPr lang="it-IT" noProof="0"/>
           </a:p>
@@ -3847,7 +3847,7 @@
             <a:pPr rtl="0"/>
             <a:fld id="{D3F07A8F-C5D3-4128-B052-E864993A59CE}" type="datetime1">
               <a:rPr lang="it-IT" noProof="0" smtClean="0"/>
-              <a:t>18/10/2025</a:t>
+              <a:t>20/10/2025</a:t>
             </a:fld>
             <a:endParaRPr lang="it-IT" noProof="0"/>
           </a:p>
@@ -4061,7 +4061,7 @@
             <a:pPr rtl="0"/>
             <a:fld id="{A36BACEF-F5E2-445B-BCCF-A68C06C41D7B}" type="datetime1">
               <a:rPr lang="it-IT" noProof="0" smtClean="0"/>
-              <a:t>18/10/2025</a:t>
+              <a:t>20/10/2025</a:t>
             </a:fld>
             <a:endParaRPr lang="it-IT" noProof="0" dirty="0"/>
           </a:p>
@@ -5156,7 +5156,7 @@
                   <a:srgbClr val="7CEBFF"/>
                 </a:solidFill>
               </a:rPr>
-              <a:t>Giorno 2</a:t>
+              <a:t>Giorno 3</a:t>
             </a:r>
           </a:p>
         </p:txBody>

</xml_diff>